<commit_message>
Charlies changes to ppt
</commit_message>
<xml_diff>
--- a/Final_Presentation.pptx
+++ b/Final_Presentation.pptx
@@ -14492,7 +14492,7 @@
           <a:bodyPr/>
           <a:lstStyle/>
           <a:p>
-            <a:endParaRPr lang="en-US"/>
+            <a:endParaRPr lang="en-US" dirty="0"/>
           </a:p>
         </p:txBody>
       </p:sp>
@@ -14789,7 +14789,11 @@
           <a:bodyPr/>
           <a:lstStyle/>
           <a:p>
-            <a:endParaRPr lang="en-US"/>
+            <a:r>
+              <a:rPr lang="en-US" dirty="0" smtClean="0"/>
+              <a:t>Evaluating our Output</a:t>
+            </a:r>
+            <a:endParaRPr lang="en-US" dirty="0"/>
           </a:p>
         </p:txBody>
       </p:sp>
@@ -14808,7 +14812,29 @@
           <a:bodyPr/>
           <a:lstStyle/>
           <a:p>
-            <a:endParaRPr lang="en-US"/>
+            <a:r>
+              <a:rPr lang="en-US" dirty="0" smtClean="0"/>
+              <a:t>What does it mean to be successful?</a:t>
+            </a:r>
+          </a:p>
+          <a:p>
+            <a:r>
+              <a:rPr lang="en-US" dirty="0" smtClean="0"/>
+              <a:t>The way a batter does against a cluster one year should predict how he does against that cluster the next year.</a:t>
+            </a:r>
+          </a:p>
+          <a:p>
+            <a:r>
+              <a:rPr lang="en-US" dirty="0" smtClean="0"/>
+              <a:t>If we sum up the differences in OBP between our predictions and the actual, the closer we are to zero, the better.</a:t>
+            </a:r>
+          </a:p>
+          <a:p>
+            <a:r>
+              <a:rPr lang="en-US" dirty="0" smtClean="0"/>
+              <a:t>We weight by plate appearances so that differences in larger clusters is worse than differences in clusters with less information.</a:t>
+            </a:r>
+            <a:endParaRPr lang="en-US" dirty="0"/>
           </a:p>
         </p:txBody>
       </p:sp>
@@ -15103,8 +15129,66 @@
             </a:r>
             <a:r>
               <a:rPr lang="en-US" dirty="0"/>
-              <a:t> DESC;</a:t>
+              <a:t> DESC</a:t>
             </a:r>
+            <a:r>
+              <a:rPr lang="en-US" dirty="0" smtClean="0"/>
+              <a:t>;</a:t>
+            </a:r>
+          </a:p>
+          <a:p>
+            <a:endParaRPr lang="en-US" dirty="0"/>
+          </a:p>
+          <a:p>
+            <a:r>
+              <a:rPr lang="en-US" dirty="0"/>
+              <a:t>MATCH (</a:t>
+            </a:r>
+            <a:r>
+              <a:rPr lang="en-US" dirty="0" err="1"/>
+              <a:t>c:cluster</a:t>
+            </a:r>
+            <a:r>
+              <a:rPr lang="en-US" dirty="0"/>
+              <a:t>)&lt;-[:MATCHUP]-(</a:t>
+            </a:r>
+            <a:r>
+              <a:rPr lang="en-US" dirty="0" err="1"/>
+              <a:t>p:player</a:t>
+            </a:r>
+            <a:r>
+              <a:rPr lang="en-US" dirty="0"/>
+              <a:t>) -[:`PLAYS FOR`] -(</a:t>
+            </a:r>
+            <a:r>
+              <a:rPr lang="en-US" dirty="0" err="1"/>
+              <a:t>t:team</a:t>
+            </a:r>
+            <a:r>
+              <a:rPr lang="en-US" dirty="0"/>
+              <a:t>) WHERE </a:t>
+            </a:r>
+            <a:r>
+              <a:rPr lang="en-US" dirty="0" err="1"/>
+              <a:t>p.name</a:t>
+            </a:r>
+            <a:r>
+              <a:rPr lang="en-US" dirty="0"/>
+              <a:t> = "Jeff </a:t>
+            </a:r>
+            <a:r>
+              <a:rPr lang="en-US" dirty="0" err="1"/>
+              <a:t>Francoeur</a:t>
+            </a:r>
+            <a:r>
+              <a:rPr lang="en-US" dirty="0"/>
+              <a:t>" RETURN </a:t>
+            </a:r>
+            <a:r>
+              <a:rPr lang="en-US" dirty="0" err="1"/>
+              <a:t>p,t,c</a:t>
+            </a:r>
+            <a:endParaRPr lang="en-US" dirty="0"/>
           </a:p>
         </p:txBody>
       </p:sp>

</xml_diff>